<commit_message>
Adicao de documentação para 3 apresentacao
</commit_message>
<xml_diff>
--- a/Apresentacao SGH.pptx
+++ b/Apresentacao SGH.pptx
@@ -15,23 +15,27 @@
     <p:sldId id="259" r:id="rId10"/>
     <p:sldId id="260" r:id="rId11"/>
     <p:sldId id="261" r:id="rId12"/>
+    <p:sldId id="262" r:id="rId13"/>
+    <p:sldId id="263" r:id="rId14"/>
+    <p:sldId id="264" r:id="rId15"/>
+    <p:sldId id="265" r:id="rId16"/>
   </p:sldIdLst>
   <p:sldSz cy="5143500" cx="9144000"/>
   <p:notesSz cx="6858000" cy="9144000"/>
   <p:embeddedFontLst>
     <p:embeddedFont>
       <p:font typeface="Raleway"/>
-      <p:regular r:id="rId13"/>
-      <p:bold r:id="rId14"/>
-      <p:italic r:id="rId15"/>
-      <p:boldItalic r:id="rId16"/>
-    </p:embeddedFont>
-    <p:embeddedFont>
-      <p:font typeface="Lato"/>
       <p:regular r:id="rId17"/>
       <p:bold r:id="rId18"/>
       <p:italic r:id="rId19"/>
       <p:boldItalic r:id="rId20"/>
+    </p:embeddedFont>
+    <p:embeddedFont>
+      <p:font typeface="Lato"/>
+      <p:regular r:id="rId21"/>
+      <p:bold r:id="rId22"/>
+      <p:italic r:id="rId23"/>
+      <p:boldItalic r:id="rId24"/>
     </p:embeddedFont>
   </p:embeddedFontLst>
   <p:defaultTextStyle>
@@ -807,6 +811,105 @@
 </p:notes>
 </file>
 
+<file path=ppt/notesSlides/notesSlide10.xml><?xml version="1.0" encoding="utf-8"?>
+<p:notes xmlns:a="http://schemas.openxmlformats.org/drawingml/2006/main" xmlns:r="http://schemas.openxmlformats.org/officeDocument/2006/relationships" xmlns:mc="http://schemas.openxmlformats.org/markup-compatibility/2006" xmlns:mv="urn:schemas-microsoft-com:mac:vml" xmlns:p="http://schemas.openxmlformats.org/presentationml/2006/main" xmlns:c="http://schemas.openxmlformats.org/drawingml/2006/chart" xmlns:dgm="http://schemas.openxmlformats.org/drawingml/2006/diagram" xmlns:o="urn:schemas-microsoft-com:office:office" xmlns:v="urn:schemas-microsoft-com:vml" xmlns:pvml="urn:schemas-microsoft-com:office:powerpoint" xmlns:com="http://schemas.openxmlformats.org/drawingml/2006/compatibility" xmlns:p14="http://schemas.microsoft.com/office/powerpoint/2010/main" xmlns:p15="http://schemas.microsoft.com/office/powerpoint/2012/main" xmlns:ahyp="http://schemas.microsoft.com/office/drawing/2018/hyperlinkcolor" showMasterPhAnim="0" showMasterSp="0">
+  <p:cSld>
+    <p:spTree>
+      <p:nvGrpSpPr>
+        <p:cNvPr id="214" name="Shape 214"/>
+        <p:cNvGrpSpPr/>
+        <p:nvPr/>
+      </p:nvGrpSpPr>
+      <p:grpSpPr>
+        <a:xfrm>
+          <a:off x="0" y="0"/>
+          <a:ext cx="0" cy="0"/>
+          <a:chOff x="0" y="0"/>
+          <a:chExt cx="0" cy="0"/>
+        </a:xfrm>
+      </p:grpSpPr>
+      <p:sp>
+        <p:nvSpPr>
+          <p:cNvPr id="215" name="Google Shape;215;g113f01f0b18_2_19:notes"/>
+          <p:cNvSpPr txBox="1"/>
+          <p:nvPr>
+            <p:ph idx="1" type="body"/>
+          </p:nvPr>
+        </p:nvSpPr>
+        <p:spPr>
+          <a:xfrm>
+            <a:off x="685800" y="4343400"/>
+            <a:ext cx="5486400" cy="4114800"/>
+          </a:xfrm>
+          <a:prstGeom prst="rect">
+            <a:avLst/>
+          </a:prstGeom>
+        </p:spPr>
+        <p:txBody>
+          <a:bodyPr anchorCtr="0" anchor="t" bIns="91425" lIns="91425" spcFirstLastPara="1" rIns="91425" wrap="square" tIns="91425">
+            <a:noAutofit/>
+          </a:bodyPr>
+          <a:lstStyle/>
+          <a:p>
+            <a:pPr indent="0" lvl="0" marL="0" rtl="0" algn="l">
+              <a:spcBef>
+                <a:spcPts val="0"/>
+              </a:spcBef>
+              <a:spcAft>
+                <a:spcPts val="0"/>
+              </a:spcAft>
+              <a:buNone/>
+            </a:pPr>
+            <a:r>
+              <a:t/>
+            </a:r>
+            <a:endParaRPr/>
+          </a:p>
+        </p:txBody>
+      </p:sp>
+      <p:sp>
+        <p:nvSpPr>
+          <p:cNvPr id="216" name="Google Shape;216;g113f01f0b18_2_19:notes"/>
+          <p:cNvSpPr/>
+          <p:nvPr>
+            <p:ph idx="2" type="sldImg"/>
+          </p:nvPr>
+        </p:nvSpPr>
+        <p:spPr>
+          <a:xfrm>
+            <a:off x="381300" y="685800"/>
+            <a:ext cx="6096075" cy="3429000"/>
+          </a:xfrm>
+          <a:custGeom>
+            <a:rect b="b" l="l" r="r" t="t"/>
+            <a:pathLst>
+              <a:path extrusionOk="0" h="120000" w="120000">
+                <a:moveTo>
+                  <a:pt x="0" y="0"/>
+                </a:moveTo>
+                <a:lnTo>
+                  <a:pt x="120000" y="0"/>
+                </a:lnTo>
+                <a:lnTo>
+                  <a:pt x="120000" y="120000"/>
+                </a:lnTo>
+                <a:lnTo>
+                  <a:pt x="0" y="120000"/>
+                </a:lnTo>
+                <a:close/>
+              </a:path>
+            </a:pathLst>
+          </a:custGeom>
+        </p:spPr>
+      </p:sp>
+    </p:spTree>
+  </p:cSld>
+  <p:clrMapOvr>
+    <a:masterClrMapping/>
+  </p:clrMapOvr>
+</p:notes>
+</file>
+
 <file path=ppt/notesSlides/notesSlide2.xml><?xml version="1.0" encoding="utf-8"?>
 <p:notes xmlns:a="http://schemas.openxmlformats.org/drawingml/2006/main" xmlns:r="http://schemas.openxmlformats.org/officeDocument/2006/relationships" xmlns:mc="http://schemas.openxmlformats.org/markup-compatibility/2006" xmlns:mv="urn:schemas-microsoft-com:mac:vml" xmlns:p="http://schemas.openxmlformats.org/presentationml/2006/main" xmlns:c="http://schemas.openxmlformats.org/drawingml/2006/chart" xmlns:dgm="http://schemas.openxmlformats.org/drawingml/2006/diagram" xmlns:o="urn:schemas-microsoft-com:office:office" xmlns:v="urn:schemas-microsoft-com:vml" xmlns:pvml="urn:schemas-microsoft-com:office:powerpoint" xmlns:com="http://schemas.openxmlformats.org/drawingml/2006/compatibility" xmlns:p14="http://schemas.microsoft.com/office/powerpoint/2010/main" xmlns:p15="http://schemas.microsoft.com/office/powerpoint/2012/main" xmlns:ahyp="http://schemas.microsoft.com/office/drawing/2018/hyperlinkcolor" showMasterPhAnim="0" showMasterSp="0">
   <p:cSld>
@@ -1325,6 +1428,321 @@
           <a:xfrm>
             <a:off x="381300" y="685800"/>
             <a:ext cx="6096000" cy="3429000"/>
+          </a:xfrm>
+          <a:custGeom>
+            <a:rect b="b" l="l" r="r" t="t"/>
+            <a:pathLst>
+              <a:path extrusionOk="0" h="120000" w="120000">
+                <a:moveTo>
+                  <a:pt x="0" y="0"/>
+                </a:moveTo>
+                <a:lnTo>
+                  <a:pt x="120000" y="0"/>
+                </a:lnTo>
+                <a:lnTo>
+                  <a:pt x="120000" y="120000"/>
+                </a:lnTo>
+                <a:lnTo>
+                  <a:pt x="0" y="120000"/>
+                </a:lnTo>
+                <a:close/>
+              </a:path>
+            </a:pathLst>
+          </a:custGeom>
+        </p:spPr>
+      </p:sp>
+    </p:spTree>
+  </p:cSld>
+  <p:clrMapOvr>
+    <a:masterClrMapping/>
+  </p:clrMapOvr>
+</p:notes>
+</file>
+
+<file path=ppt/notesSlides/notesSlide7.xml><?xml version="1.0" encoding="utf-8"?>
+<p:notes xmlns:a="http://schemas.openxmlformats.org/drawingml/2006/main" xmlns:r="http://schemas.openxmlformats.org/officeDocument/2006/relationships" xmlns:mc="http://schemas.openxmlformats.org/markup-compatibility/2006" xmlns:mv="urn:schemas-microsoft-com:mac:vml" xmlns:p="http://schemas.openxmlformats.org/presentationml/2006/main" xmlns:c="http://schemas.openxmlformats.org/drawingml/2006/chart" xmlns:dgm="http://schemas.openxmlformats.org/drawingml/2006/diagram" xmlns:o="urn:schemas-microsoft-com:office:office" xmlns:v="urn:schemas-microsoft-com:vml" xmlns:pvml="urn:schemas-microsoft-com:office:powerpoint" xmlns:com="http://schemas.openxmlformats.org/drawingml/2006/compatibility" xmlns:p14="http://schemas.microsoft.com/office/powerpoint/2010/main" xmlns:p15="http://schemas.microsoft.com/office/powerpoint/2012/main" xmlns:ahyp="http://schemas.microsoft.com/office/drawing/2018/hyperlinkcolor" showMasterPhAnim="0" showMasterSp="0">
+  <p:cSld>
+    <p:spTree>
+      <p:nvGrpSpPr>
+        <p:cNvPr id="195" name="Shape 195"/>
+        <p:cNvGrpSpPr/>
+        <p:nvPr/>
+      </p:nvGrpSpPr>
+      <p:grpSpPr>
+        <a:xfrm>
+          <a:off x="0" y="0"/>
+          <a:ext cx="0" cy="0"/>
+          <a:chOff x="0" y="0"/>
+          <a:chExt cx="0" cy="0"/>
+        </a:xfrm>
+      </p:grpSpPr>
+      <p:sp>
+        <p:nvSpPr>
+          <p:cNvPr id="196" name="Google Shape;196;g113f01f0b18_2_0:notes"/>
+          <p:cNvSpPr/>
+          <p:nvPr>
+            <p:ph idx="2" type="sldImg"/>
+          </p:nvPr>
+        </p:nvSpPr>
+        <p:spPr>
+          <a:xfrm>
+            <a:off x="381000" y="685800"/>
+            <a:ext cx="6096000" cy="3429000"/>
+          </a:xfrm>
+          <a:custGeom>
+            <a:rect b="b" l="l" r="r" t="t"/>
+            <a:pathLst>
+              <a:path extrusionOk="0" h="120000" w="120000">
+                <a:moveTo>
+                  <a:pt x="0" y="0"/>
+                </a:moveTo>
+                <a:lnTo>
+                  <a:pt x="120000" y="0"/>
+                </a:lnTo>
+                <a:lnTo>
+                  <a:pt x="120000" y="120000"/>
+                </a:lnTo>
+                <a:lnTo>
+                  <a:pt x="0" y="120000"/>
+                </a:lnTo>
+                <a:close/>
+              </a:path>
+            </a:pathLst>
+          </a:custGeom>
+          <a:noFill/>
+          <a:ln cap="flat" cmpd="sng" w="9525">
+            <a:solidFill>
+              <a:srgbClr val="000000"/>
+            </a:solidFill>
+            <a:prstDash val="solid"/>
+            <a:round/>
+            <a:headEnd len="sm" w="sm" type="none"/>
+            <a:tailEnd len="sm" w="sm" type="none"/>
+          </a:ln>
+        </p:spPr>
+      </p:sp>
+      <p:sp>
+        <p:nvSpPr>
+          <p:cNvPr id="197" name="Google Shape;197;g113f01f0b18_2_0:notes"/>
+          <p:cNvSpPr txBox="1"/>
+          <p:nvPr>
+            <p:ph idx="1" type="body"/>
+          </p:nvPr>
+        </p:nvSpPr>
+        <p:spPr>
+          <a:xfrm>
+            <a:off x="685800" y="4343400"/>
+            <a:ext cx="5486400" cy="4114800"/>
+          </a:xfrm>
+          <a:prstGeom prst="rect">
+            <a:avLst/>
+          </a:prstGeom>
+          <a:noFill/>
+          <a:ln>
+            <a:noFill/>
+          </a:ln>
+        </p:spPr>
+        <p:txBody>
+          <a:bodyPr anchorCtr="0" anchor="t" bIns="91425" lIns="91425" spcFirstLastPara="1" rIns="91425" wrap="square" tIns="91425">
+            <a:noAutofit/>
+          </a:bodyPr>
+          <a:lstStyle/>
+          <a:p>
+            <a:pPr indent="0" lvl="0" marL="0" rtl="0" algn="l">
+              <a:lnSpc>
+                <a:spcPct val="100000"/>
+              </a:lnSpc>
+              <a:spcBef>
+                <a:spcPts val="0"/>
+              </a:spcBef>
+              <a:spcAft>
+                <a:spcPts val="0"/>
+              </a:spcAft>
+              <a:buSzPts val="1100"/>
+              <a:buNone/>
+            </a:pPr>
+            <a:r>
+              <a:t/>
+            </a:r>
+            <a:endParaRPr/>
+          </a:p>
+        </p:txBody>
+      </p:sp>
+    </p:spTree>
+  </p:cSld>
+  <p:clrMapOvr>
+    <a:masterClrMapping/>
+  </p:clrMapOvr>
+</p:notes>
+</file>
+
+<file path=ppt/notesSlides/notesSlide8.xml><?xml version="1.0" encoding="utf-8"?>
+<p:notes xmlns:a="http://schemas.openxmlformats.org/drawingml/2006/main" xmlns:r="http://schemas.openxmlformats.org/officeDocument/2006/relationships" xmlns:mc="http://schemas.openxmlformats.org/markup-compatibility/2006" xmlns:mv="urn:schemas-microsoft-com:mac:vml" xmlns:p="http://schemas.openxmlformats.org/presentationml/2006/main" xmlns:c="http://schemas.openxmlformats.org/drawingml/2006/chart" xmlns:dgm="http://schemas.openxmlformats.org/drawingml/2006/diagram" xmlns:o="urn:schemas-microsoft-com:office:office" xmlns:v="urn:schemas-microsoft-com:vml" xmlns:pvml="urn:schemas-microsoft-com:office:powerpoint" xmlns:com="http://schemas.openxmlformats.org/drawingml/2006/compatibility" xmlns:p14="http://schemas.microsoft.com/office/powerpoint/2010/main" xmlns:p15="http://schemas.microsoft.com/office/powerpoint/2012/main" xmlns:ahyp="http://schemas.microsoft.com/office/drawing/2018/hyperlinkcolor" showMasterPhAnim="0" showMasterSp="0">
+  <p:cSld>
+    <p:spTree>
+      <p:nvGrpSpPr>
+        <p:cNvPr id="201" name="Shape 201"/>
+        <p:cNvGrpSpPr/>
+        <p:nvPr/>
+      </p:nvGrpSpPr>
+      <p:grpSpPr>
+        <a:xfrm>
+          <a:off x="0" y="0"/>
+          <a:ext cx="0" cy="0"/>
+          <a:chOff x="0" y="0"/>
+          <a:chExt cx="0" cy="0"/>
+        </a:xfrm>
+      </p:grpSpPr>
+      <p:sp>
+        <p:nvSpPr>
+          <p:cNvPr id="202" name="Google Shape;202;g113f01f0b18_0_0:notes"/>
+          <p:cNvSpPr txBox="1"/>
+          <p:nvPr>
+            <p:ph idx="1" type="body"/>
+          </p:nvPr>
+        </p:nvSpPr>
+        <p:spPr>
+          <a:xfrm>
+            <a:off x="685800" y="4343400"/>
+            <a:ext cx="5486400" cy="4114800"/>
+          </a:xfrm>
+          <a:prstGeom prst="rect">
+            <a:avLst/>
+          </a:prstGeom>
+        </p:spPr>
+        <p:txBody>
+          <a:bodyPr anchorCtr="0" anchor="t" bIns="91425" lIns="91425" spcFirstLastPara="1" rIns="91425" wrap="square" tIns="91425">
+            <a:noAutofit/>
+          </a:bodyPr>
+          <a:lstStyle/>
+          <a:p>
+            <a:pPr indent="0" lvl="0" marL="0" rtl="0" algn="l">
+              <a:spcBef>
+                <a:spcPts val="0"/>
+              </a:spcBef>
+              <a:spcAft>
+                <a:spcPts val="0"/>
+              </a:spcAft>
+              <a:buNone/>
+            </a:pPr>
+            <a:r>
+              <a:t/>
+            </a:r>
+            <a:endParaRPr/>
+          </a:p>
+        </p:txBody>
+      </p:sp>
+      <p:sp>
+        <p:nvSpPr>
+          <p:cNvPr id="203" name="Google Shape;203;g113f01f0b18_0_0:notes"/>
+          <p:cNvSpPr/>
+          <p:nvPr>
+            <p:ph idx="2" type="sldImg"/>
+          </p:nvPr>
+        </p:nvSpPr>
+        <p:spPr>
+          <a:xfrm>
+            <a:off x="381300" y="685800"/>
+            <a:ext cx="6096000" cy="3429000"/>
+          </a:xfrm>
+          <a:custGeom>
+            <a:rect b="b" l="l" r="r" t="t"/>
+            <a:pathLst>
+              <a:path extrusionOk="0" h="120000" w="120000">
+                <a:moveTo>
+                  <a:pt x="0" y="0"/>
+                </a:moveTo>
+                <a:lnTo>
+                  <a:pt x="120000" y="0"/>
+                </a:lnTo>
+                <a:lnTo>
+                  <a:pt x="120000" y="120000"/>
+                </a:lnTo>
+                <a:lnTo>
+                  <a:pt x="0" y="120000"/>
+                </a:lnTo>
+                <a:close/>
+              </a:path>
+            </a:pathLst>
+          </a:custGeom>
+        </p:spPr>
+      </p:sp>
+    </p:spTree>
+  </p:cSld>
+  <p:clrMapOvr>
+    <a:masterClrMapping/>
+  </p:clrMapOvr>
+</p:notes>
+</file>
+
+<file path=ppt/notesSlides/notesSlide9.xml><?xml version="1.0" encoding="utf-8"?>
+<p:notes xmlns:a="http://schemas.openxmlformats.org/drawingml/2006/main" xmlns:r="http://schemas.openxmlformats.org/officeDocument/2006/relationships" xmlns:mc="http://schemas.openxmlformats.org/markup-compatibility/2006" xmlns:mv="urn:schemas-microsoft-com:mac:vml" xmlns:p="http://schemas.openxmlformats.org/presentationml/2006/main" xmlns:c="http://schemas.openxmlformats.org/drawingml/2006/chart" xmlns:dgm="http://schemas.openxmlformats.org/drawingml/2006/diagram" xmlns:o="urn:schemas-microsoft-com:office:office" xmlns:v="urn:schemas-microsoft-com:vml" xmlns:pvml="urn:schemas-microsoft-com:office:powerpoint" xmlns:com="http://schemas.openxmlformats.org/drawingml/2006/compatibility" xmlns:p14="http://schemas.microsoft.com/office/powerpoint/2010/main" xmlns:p15="http://schemas.microsoft.com/office/powerpoint/2012/main" xmlns:ahyp="http://schemas.microsoft.com/office/drawing/2018/hyperlinkcolor" showMasterPhAnim="0" showMasterSp="0">
+  <p:cSld>
+    <p:spTree>
+      <p:nvGrpSpPr>
+        <p:cNvPr id="208" name="Shape 208"/>
+        <p:cNvGrpSpPr/>
+        <p:nvPr/>
+      </p:nvGrpSpPr>
+      <p:grpSpPr>
+        <a:xfrm>
+          <a:off x="0" y="0"/>
+          <a:ext cx="0" cy="0"/>
+          <a:chOff x="0" y="0"/>
+          <a:chExt cx="0" cy="0"/>
+        </a:xfrm>
+      </p:grpSpPr>
+      <p:sp>
+        <p:nvSpPr>
+          <p:cNvPr id="209" name="Google Shape;209;g113f01f0b18_2_14:notes"/>
+          <p:cNvSpPr txBox="1"/>
+          <p:nvPr>
+            <p:ph idx="1" type="body"/>
+          </p:nvPr>
+        </p:nvSpPr>
+        <p:spPr>
+          <a:xfrm>
+            <a:off x="685800" y="4343400"/>
+            <a:ext cx="5486400" cy="4114800"/>
+          </a:xfrm>
+          <a:prstGeom prst="rect">
+            <a:avLst/>
+          </a:prstGeom>
+        </p:spPr>
+        <p:txBody>
+          <a:bodyPr anchorCtr="0" anchor="t" bIns="91425" lIns="91425" spcFirstLastPara="1" rIns="91425" wrap="square" tIns="91425">
+            <a:noAutofit/>
+          </a:bodyPr>
+          <a:lstStyle/>
+          <a:p>
+            <a:pPr indent="0" lvl="0" marL="0" rtl="0" algn="l">
+              <a:spcBef>
+                <a:spcPts val="0"/>
+              </a:spcBef>
+              <a:spcAft>
+                <a:spcPts val="0"/>
+              </a:spcAft>
+              <a:buNone/>
+            </a:pPr>
+            <a:r>
+              <a:t/>
+            </a:r>
+            <a:endParaRPr/>
+          </a:p>
+        </p:txBody>
+      </p:sp>
+      <p:sp>
+        <p:nvSpPr>
+          <p:cNvPr id="210" name="Google Shape;210;g113f01f0b18_2_14:notes"/>
+          <p:cNvSpPr/>
+          <p:nvPr>
+            <p:ph idx="2" type="sldImg"/>
+          </p:nvPr>
+        </p:nvSpPr>
+        <p:spPr>
+          <a:xfrm>
+            <a:off x="381300" y="685800"/>
+            <a:ext cx="6096075" cy="3429000"/>
           </a:xfrm>
           <a:custGeom>
             <a:rect b="b" l="l" r="r" t="t"/>
@@ -17059,7 +17477,7 @@
 </file>
 
 <file path=ppt/slides/slide1.xml><?xml version="1.0" encoding="utf-8"?>
-<p:sld xmlns:a="http://schemas.openxmlformats.org/drawingml/2006/main" xmlns:r="http://schemas.openxmlformats.org/officeDocument/2006/relationships" xmlns:mc="http://schemas.openxmlformats.org/markup-compatibility/2006" xmlns:mv="urn:schemas-microsoft-com:mac:vml" xmlns:p="http://schemas.openxmlformats.org/presentationml/2006/main" xmlns:c="http://schemas.openxmlformats.org/drawingml/2006/chart" xmlns:dgm="http://schemas.openxmlformats.org/drawingml/2006/diagram" xmlns:o="urn:schemas-microsoft-com:office:office" xmlns:v="urn:schemas-microsoft-com:vml" xmlns:pvml="urn:schemas-microsoft-com:office:powerpoint" xmlns:com="http://schemas.openxmlformats.org/drawingml/2006/compatibility" xmlns:p14="http://schemas.microsoft.com/office/powerpoint/2010/main" xmlns:p15="http://schemas.microsoft.com/office/powerpoint/2012/main" xmlns:ahyp="http://schemas.microsoft.com/office/drawing/2018/hyperlinkcolor">
+<p:sld xmlns:a="http://schemas.openxmlformats.org/drawingml/2006/main" xmlns:r="http://schemas.openxmlformats.org/officeDocument/2006/relationships" xmlns:mc="http://schemas.openxmlformats.org/markup-compatibility/2006" xmlns:mv="urn:schemas-microsoft-com:mac:vml" xmlns:p="http://schemas.openxmlformats.org/presentationml/2006/main" xmlns:c="http://schemas.openxmlformats.org/drawingml/2006/chart" xmlns:dgm="http://schemas.openxmlformats.org/drawingml/2006/diagram" xmlns:o="urn:schemas-microsoft-com:office:office" xmlns:v="urn:schemas-microsoft-com:vml" xmlns:pvml="urn:schemas-microsoft-com:office:powerpoint" xmlns:com="http://schemas.openxmlformats.org/drawingml/2006/compatibility" xmlns:p14="http://schemas.microsoft.com/office/powerpoint/2010/main" xmlns:p15="http://schemas.microsoft.com/office/powerpoint/2012/main" xmlns:ahyp="http://schemas.microsoft.com/office/drawing/2018/hyperlinkcolor" show="0">
   <p:cSld>
     <p:spTree>
       <p:nvGrpSpPr>
@@ -17179,8 +17597,188 @@
 </p:sld>
 </file>
 
+<file path=ppt/slides/slide10.xml><?xml version="1.0" encoding="utf-8"?>
+<p:sld xmlns:a="http://schemas.openxmlformats.org/drawingml/2006/main" xmlns:r="http://schemas.openxmlformats.org/officeDocument/2006/relationships" xmlns:mc="http://schemas.openxmlformats.org/markup-compatibility/2006" xmlns:mv="urn:schemas-microsoft-com:mac:vml" xmlns:p="http://schemas.openxmlformats.org/presentationml/2006/main" xmlns:c="http://schemas.openxmlformats.org/drawingml/2006/chart" xmlns:dgm="http://schemas.openxmlformats.org/drawingml/2006/diagram" xmlns:o="urn:schemas-microsoft-com:office:office" xmlns:v="urn:schemas-microsoft-com:vml" xmlns:pvml="urn:schemas-microsoft-com:office:powerpoint" xmlns:com="http://schemas.openxmlformats.org/drawingml/2006/compatibility" xmlns:p14="http://schemas.microsoft.com/office/powerpoint/2010/main" xmlns:p15="http://schemas.microsoft.com/office/powerpoint/2012/main" xmlns:ahyp="http://schemas.microsoft.com/office/drawing/2018/hyperlinkcolor">
+  <p:cSld>
+    <p:spTree>
+      <p:nvGrpSpPr>
+        <p:cNvPr id="217" name="Shape 217"/>
+        <p:cNvGrpSpPr/>
+        <p:nvPr/>
+      </p:nvGrpSpPr>
+      <p:grpSpPr>
+        <a:xfrm>
+          <a:off x="0" y="0"/>
+          <a:ext cx="0" cy="0"/>
+          <a:chOff x="0" y="0"/>
+          <a:chExt cx="0" cy="0"/>
+        </a:xfrm>
+      </p:grpSpPr>
+      <p:sp>
+        <p:nvSpPr>
+          <p:cNvPr id="218" name="Google Shape;218;p34"/>
+          <p:cNvSpPr txBox="1"/>
+          <p:nvPr>
+            <p:ph type="title"/>
+          </p:nvPr>
+        </p:nvSpPr>
+        <p:spPr>
+          <a:xfrm>
+            <a:off x="0" y="501527"/>
+            <a:ext cx="7688700" cy="535200"/>
+          </a:xfrm>
+          <a:prstGeom prst="rect">
+            <a:avLst/>
+          </a:prstGeom>
+          <a:noFill/>
+          <a:ln>
+            <a:noFill/>
+          </a:ln>
+        </p:spPr>
+        <p:txBody>
+          <a:bodyPr anchorCtr="0" anchor="t" bIns="91425" lIns="91425" spcFirstLastPara="1" rIns="91425" wrap="square" tIns="91425">
+            <a:normAutofit/>
+          </a:bodyPr>
+          <a:lstStyle/>
+          <a:p>
+            <a:pPr indent="0" lvl="0" marL="0" rtl="0" algn="l">
+              <a:lnSpc>
+                <a:spcPct val="100000"/>
+              </a:lnSpc>
+              <a:spcBef>
+                <a:spcPts val="0"/>
+              </a:spcBef>
+              <a:spcAft>
+                <a:spcPts val="0"/>
+              </a:spcAft>
+              <a:buSzPts val="2600"/>
+              <a:buNone/>
+            </a:pPr>
+            <a:r>
+              <a:rPr lang="pt-BR" sz="2300">
+                <a:latin typeface="Raleway"/>
+                <a:ea typeface="Raleway"/>
+                <a:cs typeface="Raleway"/>
+                <a:sym typeface="Raleway"/>
+              </a:rPr>
+              <a:t>Arquitetura &gt; Time</a:t>
+            </a:r>
+            <a:endParaRPr/>
+          </a:p>
+        </p:txBody>
+      </p:sp>
+      <p:pic>
+        <p:nvPicPr>
+          <p:cNvPr id="219" name="Google Shape;219;p34"/>
+          <p:cNvPicPr preferRelativeResize="0"/>
+          <p:nvPr/>
+        </p:nvPicPr>
+        <p:blipFill rotWithShape="1">
+          <a:blip r:embed="rId3">
+            <a:alphaModFix/>
+          </a:blip>
+          <a:srcRect b="0" l="0" r="0" t="0"/>
+          <a:stretch/>
+        </p:blipFill>
+        <p:spPr>
+          <a:xfrm>
+            <a:off x="580450" y="1338275"/>
+            <a:ext cx="7900676" cy="3805226"/>
+          </a:xfrm>
+          <a:prstGeom prst="rect">
+            <a:avLst/>
+          </a:prstGeom>
+          <a:noFill/>
+          <a:ln>
+            <a:noFill/>
+          </a:ln>
+        </p:spPr>
+      </p:pic>
+    </p:spTree>
+  </p:cSld>
+  <p:clrMapOvr>
+    <a:masterClrMapping/>
+  </p:clrMapOvr>
+  <p:timing>
+    <p:tnLst>
+      <p:par>
+        <p:cTn dur="indefinite" nodeType="tmRoot" restart="never">
+          <p:childTnLst>
+            <p:seq concurrent="1" nextAc="seek">
+              <p:cTn dur="indefinite" id="2" nodeType="mainSeq">
+                <p:childTnLst>
+                  <p:par>
+                    <p:cTn fill="hold">
+                      <p:stCondLst>
+                        <p:cond delay="indefinite"/>
+                      </p:stCondLst>
+                      <p:childTnLst>
+                        <p:par>
+                          <p:cTn fill="hold">
+                            <p:stCondLst>
+                              <p:cond delay="0"/>
+                            </p:stCondLst>
+                            <p:childTnLst>
+                              <p:par>
+                                <p:cTn fill="hold" nodeType="clickEffect" presetClass="entr" presetID="1" presetSubtype="0">
+                                  <p:stCondLst>
+                                    <p:cond delay="0"/>
+                                  </p:stCondLst>
+                                  <p:childTnLst>
+                                    <p:set>
+                                      <p:cBhvr>
+                                        <p:cTn dur="1" fill="hold">
+                                          <p:stCondLst>
+                                            <p:cond delay="0"/>
+                                          </p:stCondLst>
+                                        </p:cTn>
+                                        <p:tgtEl>
+                                          <p:spTgt spid="219"/>
+                                        </p:tgtEl>
+                                        <p:attrNameLst>
+                                          <p:attrName>style.visibility</p:attrName>
+                                        </p:attrNameLst>
+                                      </p:cBhvr>
+                                      <p:to>
+                                        <p:strVal val="visible"/>
+                                      </p:to>
+                                    </p:set>
+                                  </p:childTnLst>
+                                </p:cTn>
+                              </p:par>
+                            </p:childTnLst>
+                          </p:cTn>
+                        </p:par>
+                      </p:childTnLst>
+                    </p:cTn>
+                  </p:par>
+                </p:childTnLst>
+              </p:cTn>
+              <p:prevCondLst>
+                <p:cond evt="onPrev">
+                  <p:tgtEl>
+                    <p:sldTgt/>
+                  </p:tgtEl>
+                </p:cond>
+              </p:prevCondLst>
+              <p:nextCondLst>
+                <p:cond evt="onNext">
+                  <p:tgtEl>
+                    <p:sldTgt/>
+                  </p:tgtEl>
+                </p:cond>
+              </p:nextCondLst>
+            </p:seq>
+          </p:childTnLst>
+        </p:cTn>
+      </p:par>
+    </p:tnLst>
+  </p:timing>
+</p:sld>
+</file>
+
 <file path=ppt/slides/slide2.xml><?xml version="1.0" encoding="utf-8"?>
-<p:sld xmlns:a="http://schemas.openxmlformats.org/drawingml/2006/main" xmlns:r="http://schemas.openxmlformats.org/officeDocument/2006/relationships" xmlns:mc="http://schemas.openxmlformats.org/markup-compatibility/2006" xmlns:mv="urn:schemas-microsoft-com:mac:vml" xmlns:p="http://schemas.openxmlformats.org/presentationml/2006/main" xmlns:c="http://schemas.openxmlformats.org/drawingml/2006/chart" xmlns:dgm="http://schemas.openxmlformats.org/drawingml/2006/diagram" xmlns:o="urn:schemas-microsoft-com:office:office" xmlns:v="urn:schemas-microsoft-com:vml" xmlns:pvml="urn:schemas-microsoft-com:office:powerpoint" xmlns:com="http://schemas.openxmlformats.org/drawingml/2006/compatibility" xmlns:p14="http://schemas.microsoft.com/office/powerpoint/2010/main" xmlns:p15="http://schemas.microsoft.com/office/powerpoint/2012/main" xmlns:ahyp="http://schemas.microsoft.com/office/drawing/2018/hyperlinkcolor">
+<p:sld xmlns:a="http://schemas.openxmlformats.org/drawingml/2006/main" xmlns:r="http://schemas.openxmlformats.org/officeDocument/2006/relationships" xmlns:mc="http://schemas.openxmlformats.org/markup-compatibility/2006" xmlns:mv="urn:schemas-microsoft-com:mac:vml" xmlns:p="http://schemas.openxmlformats.org/presentationml/2006/main" xmlns:c="http://schemas.openxmlformats.org/drawingml/2006/chart" xmlns:dgm="http://schemas.openxmlformats.org/drawingml/2006/diagram" xmlns:o="urn:schemas-microsoft-com:office:office" xmlns:v="urn:schemas-microsoft-com:vml" xmlns:pvml="urn:schemas-microsoft-com:office:powerpoint" xmlns:com="http://schemas.openxmlformats.org/drawingml/2006/compatibility" xmlns:p14="http://schemas.microsoft.com/office/powerpoint/2010/main" xmlns:p15="http://schemas.microsoft.com/office/powerpoint/2012/main" xmlns:ahyp="http://schemas.microsoft.com/office/drawing/2018/hyperlinkcolor" show="0">
   <p:cSld>
     <p:spTree>
       <p:nvGrpSpPr>
@@ -17479,7 +18077,7 @@
 </file>
 
 <file path=ppt/slides/slide3.xml><?xml version="1.0" encoding="utf-8"?>
-<p:sld xmlns:a="http://schemas.openxmlformats.org/drawingml/2006/main" xmlns:r="http://schemas.openxmlformats.org/officeDocument/2006/relationships" xmlns:mc="http://schemas.openxmlformats.org/markup-compatibility/2006" xmlns:mv="urn:schemas-microsoft-com:mac:vml" xmlns:p="http://schemas.openxmlformats.org/presentationml/2006/main" xmlns:c="http://schemas.openxmlformats.org/drawingml/2006/chart" xmlns:dgm="http://schemas.openxmlformats.org/drawingml/2006/diagram" xmlns:o="urn:schemas-microsoft-com:office:office" xmlns:v="urn:schemas-microsoft-com:vml" xmlns:pvml="urn:schemas-microsoft-com:office:powerpoint" xmlns:com="http://schemas.openxmlformats.org/drawingml/2006/compatibility" xmlns:p14="http://schemas.microsoft.com/office/powerpoint/2010/main" xmlns:p15="http://schemas.microsoft.com/office/powerpoint/2012/main" xmlns:ahyp="http://schemas.microsoft.com/office/drawing/2018/hyperlinkcolor">
+<p:sld xmlns:a="http://schemas.openxmlformats.org/drawingml/2006/main" xmlns:r="http://schemas.openxmlformats.org/officeDocument/2006/relationships" xmlns:mc="http://schemas.openxmlformats.org/markup-compatibility/2006" xmlns:mv="urn:schemas-microsoft-com:mac:vml" xmlns:p="http://schemas.openxmlformats.org/presentationml/2006/main" xmlns:c="http://schemas.openxmlformats.org/drawingml/2006/chart" xmlns:dgm="http://schemas.openxmlformats.org/drawingml/2006/diagram" xmlns:o="urn:schemas-microsoft-com:office:office" xmlns:v="urn:schemas-microsoft-com:vml" xmlns:pvml="urn:schemas-microsoft-com:office:powerpoint" xmlns:com="http://schemas.openxmlformats.org/drawingml/2006/compatibility" xmlns:p14="http://schemas.microsoft.com/office/powerpoint/2010/main" xmlns:p15="http://schemas.microsoft.com/office/powerpoint/2012/main" xmlns:ahyp="http://schemas.microsoft.com/office/drawing/2018/hyperlinkcolor" show="0">
   <p:cSld>
     <p:spTree>
       <p:nvGrpSpPr>
@@ -17532,7 +18130,11 @@
               <a:spcAft>
                 <a:spcPts val="0"/>
               </a:spcAft>
+              <a:buClr>
+                <a:srgbClr val="000000"/>
+              </a:buClr>
               <a:buSzPct val="111111"/>
+              <a:buFont typeface="Arial"/>
               <a:buNone/>
             </a:pPr>
             <a:r>
@@ -17554,7 +18156,7 @@
         <p:spPr>
           <a:xfrm>
             <a:off x="729450" y="1816114"/>
-            <a:ext cx="8225364" cy="3197318"/>
+            <a:ext cx="8225400" cy="3197400"/>
           </a:xfrm>
           <a:prstGeom prst="rect">
             <a:avLst/>
@@ -17954,7 +18556,7 @@
 </file>
 
 <file path=ppt/slides/slide4.xml><?xml version="1.0" encoding="utf-8"?>
-<p:sld xmlns:a="http://schemas.openxmlformats.org/drawingml/2006/main" xmlns:r="http://schemas.openxmlformats.org/officeDocument/2006/relationships" xmlns:mc="http://schemas.openxmlformats.org/markup-compatibility/2006" xmlns:mv="urn:schemas-microsoft-com:mac:vml" xmlns:p="http://schemas.openxmlformats.org/presentationml/2006/main" xmlns:c="http://schemas.openxmlformats.org/drawingml/2006/chart" xmlns:dgm="http://schemas.openxmlformats.org/drawingml/2006/diagram" xmlns:o="urn:schemas-microsoft-com:office:office" xmlns:v="urn:schemas-microsoft-com:vml" xmlns:pvml="urn:schemas-microsoft-com:office:powerpoint" xmlns:com="http://schemas.openxmlformats.org/drawingml/2006/compatibility" xmlns:p14="http://schemas.microsoft.com/office/powerpoint/2010/main" xmlns:p15="http://schemas.microsoft.com/office/powerpoint/2012/main" xmlns:ahyp="http://schemas.microsoft.com/office/drawing/2018/hyperlinkcolor">
+<p:sld xmlns:a="http://schemas.openxmlformats.org/drawingml/2006/main" xmlns:r="http://schemas.openxmlformats.org/officeDocument/2006/relationships" xmlns:mc="http://schemas.openxmlformats.org/markup-compatibility/2006" xmlns:mv="urn:schemas-microsoft-com:mac:vml" xmlns:p="http://schemas.openxmlformats.org/presentationml/2006/main" xmlns:c="http://schemas.openxmlformats.org/drawingml/2006/chart" xmlns:dgm="http://schemas.openxmlformats.org/drawingml/2006/diagram" xmlns:o="urn:schemas-microsoft-com:office:office" xmlns:v="urn:schemas-microsoft-com:vml" xmlns:pvml="urn:schemas-microsoft-com:office:powerpoint" xmlns:com="http://schemas.openxmlformats.org/drawingml/2006/compatibility" xmlns:p14="http://schemas.microsoft.com/office/powerpoint/2010/main" xmlns:p15="http://schemas.microsoft.com/office/powerpoint/2012/main" xmlns:ahyp="http://schemas.microsoft.com/office/drawing/2018/hyperlinkcolor" show="0">
   <p:cSld>
     <p:spTree>
       <p:nvGrpSpPr>
@@ -18407,7 +19009,7 @@
 </file>
 
 <file path=ppt/slides/slide5.xml><?xml version="1.0" encoding="utf-8"?>
-<p:sld xmlns:a="http://schemas.openxmlformats.org/drawingml/2006/main" xmlns:r="http://schemas.openxmlformats.org/officeDocument/2006/relationships" xmlns:mc="http://schemas.openxmlformats.org/markup-compatibility/2006" xmlns:mv="urn:schemas-microsoft-com:mac:vml" xmlns:p="http://schemas.openxmlformats.org/presentationml/2006/main" xmlns:c="http://schemas.openxmlformats.org/drawingml/2006/chart" xmlns:dgm="http://schemas.openxmlformats.org/drawingml/2006/diagram" xmlns:o="urn:schemas-microsoft-com:office:office" xmlns:v="urn:schemas-microsoft-com:vml" xmlns:pvml="urn:schemas-microsoft-com:office:powerpoint" xmlns:com="http://schemas.openxmlformats.org/drawingml/2006/compatibility" xmlns:p14="http://schemas.microsoft.com/office/powerpoint/2010/main" xmlns:p15="http://schemas.microsoft.com/office/powerpoint/2012/main" xmlns:ahyp="http://schemas.microsoft.com/office/drawing/2018/hyperlinkcolor">
+<p:sld xmlns:a="http://schemas.openxmlformats.org/drawingml/2006/main" xmlns:r="http://schemas.openxmlformats.org/officeDocument/2006/relationships" xmlns:mc="http://schemas.openxmlformats.org/markup-compatibility/2006" xmlns:mv="urn:schemas-microsoft-com:mac:vml" xmlns:p="http://schemas.openxmlformats.org/presentationml/2006/main" xmlns:c="http://schemas.openxmlformats.org/drawingml/2006/chart" xmlns:dgm="http://schemas.openxmlformats.org/drawingml/2006/diagram" xmlns:o="urn:schemas-microsoft-com:office:office" xmlns:v="urn:schemas-microsoft-com:vml" xmlns:pvml="urn:schemas-microsoft-com:office:powerpoint" xmlns:com="http://schemas.openxmlformats.org/drawingml/2006/compatibility" xmlns:p14="http://schemas.microsoft.com/office/powerpoint/2010/main" xmlns:p15="http://schemas.microsoft.com/office/powerpoint/2012/main" xmlns:ahyp="http://schemas.microsoft.com/office/drawing/2018/hyperlinkcolor" show="0">
   <p:cSld>
     <p:spTree>
       <p:nvGrpSpPr>
@@ -18761,7 +19363,7 @@
 </file>
 
 <file path=ppt/slides/slide6.xml><?xml version="1.0" encoding="utf-8"?>
-<p:sld xmlns:a="http://schemas.openxmlformats.org/drawingml/2006/main" xmlns:r="http://schemas.openxmlformats.org/officeDocument/2006/relationships" xmlns:mc="http://schemas.openxmlformats.org/markup-compatibility/2006" xmlns:mv="urn:schemas-microsoft-com:mac:vml" xmlns:p="http://schemas.openxmlformats.org/presentationml/2006/main" xmlns:c="http://schemas.openxmlformats.org/drawingml/2006/chart" xmlns:dgm="http://schemas.openxmlformats.org/drawingml/2006/diagram" xmlns:o="urn:schemas-microsoft-com:office:office" xmlns:v="urn:schemas-microsoft-com:vml" xmlns:pvml="urn:schemas-microsoft-com:office:powerpoint" xmlns:com="http://schemas.openxmlformats.org/drawingml/2006/compatibility" xmlns:p14="http://schemas.microsoft.com/office/powerpoint/2010/main" xmlns:p15="http://schemas.microsoft.com/office/powerpoint/2012/main" xmlns:ahyp="http://schemas.microsoft.com/office/drawing/2018/hyperlinkcolor">
+<p:sld xmlns:a="http://schemas.openxmlformats.org/drawingml/2006/main" xmlns:r="http://schemas.openxmlformats.org/officeDocument/2006/relationships" xmlns:mc="http://schemas.openxmlformats.org/markup-compatibility/2006" xmlns:mv="urn:schemas-microsoft-com:mac:vml" xmlns:p="http://schemas.openxmlformats.org/presentationml/2006/main" xmlns:c="http://schemas.openxmlformats.org/drawingml/2006/chart" xmlns:dgm="http://schemas.openxmlformats.org/drawingml/2006/diagram" xmlns:o="urn:schemas-microsoft-com:office:office" xmlns:v="urn:schemas-microsoft-com:vml" xmlns:pvml="urn:schemas-microsoft-com:office:powerpoint" xmlns:com="http://schemas.openxmlformats.org/drawingml/2006/compatibility" xmlns:p14="http://schemas.microsoft.com/office/powerpoint/2010/main" xmlns:p15="http://schemas.microsoft.com/office/powerpoint/2012/main" xmlns:ahyp="http://schemas.microsoft.com/office/drawing/2018/hyperlinkcolor" show="0">
   <p:cSld>
     <p:spTree>
       <p:nvGrpSpPr>
@@ -19252,45 +19854,547 @@
 </p:sld>
 </file>
 
+<file path=ppt/slides/slide7.xml><?xml version="1.0" encoding="utf-8"?>
+<p:sld xmlns:a="http://schemas.openxmlformats.org/drawingml/2006/main" xmlns:r="http://schemas.openxmlformats.org/officeDocument/2006/relationships" xmlns:mc="http://schemas.openxmlformats.org/markup-compatibility/2006" xmlns:mv="urn:schemas-microsoft-com:mac:vml" xmlns:p="http://schemas.openxmlformats.org/presentationml/2006/main" xmlns:c="http://schemas.openxmlformats.org/drawingml/2006/chart" xmlns:dgm="http://schemas.openxmlformats.org/drawingml/2006/diagram" xmlns:o="urn:schemas-microsoft-com:office:office" xmlns:v="urn:schemas-microsoft-com:vml" xmlns:pvml="urn:schemas-microsoft-com:office:powerpoint" xmlns:com="http://schemas.openxmlformats.org/drawingml/2006/compatibility" xmlns:p14="http://schemas.microsoft.com/office/powerpoint/2010/main" xmlns:p15="http://schemas.microsoft.com/office/powerpoint/2012/main" xmlns:ahyp="http://schemas.microsoft.com/office/drawing/2018/hyperlinkcolor">
+  <p:cSld>
+    <p:spTree>
+      <p:nvGrpSpPr>
+        <p:cNvPr id="198" name="Shape 198"/>
+        <p:cNvGrpSpPr/>
+        <p:nvPr/>
+      </p:nvGrpSpPr>
+      <p:grpSpPr>
+        <a:xfrm>
+          <a:off x="0" y="0"/>
+          <a:ext cx="0" cy="0"/>
+          <a:chOff x="0" y="0"/>
+          <a:chExt cx="0" cy="0"/>
+        </a:xfrm>
+      </p:grpSpPr>
+      <p:sp>
+        <p:nvSpPr>
+          <p:cNvPr id="199" name="Google Shape;199;p31"/>
+          <p:cNvSpPr txBox="1"/>
+          <p:nvPr>
+            <p:ph type="ctrTitle"/>
+          </p:nvPr>
+        </p:nvSpPr>
+        <p:spPr>
+          <a:xfrm>
+            <a:off x="729450" y="1322450"/>
+            <a:ext cx="7688100" cy="1664700"/>
+          </a:xfrm>
+          <a:prstGeom prst="rect">
+            <a:avLst/>
+          </a:prstGeom>
+          <a:noFill/>
+          <a:ln>
+            <a:noFill/>
+          </a:ln>
+        </p:spPr>
+        <p:txBody>
+          <a:bodyPr anchorCtr="0" anchor="t" bIns="91425" lIns="91425" spcFirstLastPara="1" rIns="91425" wrap="square" tIns="91425">
+            <a:normAutofit/>
+          </a:bodyPr>
+          <a:lstStyle/>
+          <a:p>
+            <a:pPr indent="0" lvl="0" marL="0" rtl="0" algn="l">
+              <a:lnSpc>
+                <a:spcPct val="100000"/>
+              </a:lnSpc>
+              <a:spcBef>
+                <a:spcPts val="0"/>
+              </a:spcBef>
+              <a:spcAft>
+                <a:spcPts val="0"/>
+              </a:spcAft>
+              <a:buSzPts val="4200"/>
+              <a:buNone/>
+            </a:pPr>
+            <a:r>
+              <a:rPr lang="pt-BR"/>
+              <a:t>Sistema de Gerenciamento Hospitalar – 3ª Entrega</a:t>
+            </a:r>
+            <a:endParaRPr/>
+          </a:p>
+        </p:txBody>
+      </p:sp>
+      <p:sp>
+        <p:nvSpPr>
+          <p:cNvPr id="200" name="Google Shape;200;p31"/>
+          <p:cNvSpPr txBox="1"/>
+          <p:nvPr>
+            <p:ph idx="1" type="subTitle"/>
+          </p:nvPr>
+        </p:nvSpPr>
+        <p:spPr>
+          <a:xfrm>
+            <a:off x="729450" y="2987150"/>
+            <a:ext cx="7688100" cy="1040100"/>
+          </a:xfrm>
+          <a:prstGeom prst="rect">
+            <a:avLst/>
+          </a:prstGeom>
+          <a:noFill/>
+          <a:ln>
+            <a:noFill/>
+          </a:ln>
+        </p:spPr>
+        <p:txBody>
+          <a:bodyPr anchorCtr="0" anchor="t" bIns="91425" lIns="91425" spcFirstLastPara="1" rIns="91425" wrap="square" tIns="91425">
+            <a:normAutofit/>
+          </a:bodyPr>
+          <a:lstStyle/>
+          <a:p>
+            <a:pPr indent="0" lvl="0" marL="0" rtl="0" algn="l">
+              <a:lnSpc>
+                <a:spcPct val="100000"/>
+              </a:lnSpc>
+              <a:spcBef>
+                <a:spcPts val="0"/>
+              </a:spcBef>
+              <a:spcAft>
+                <a:spcPts val="0"/>
+              </a:spcAft>
+              <a:buSzPts val="1882"/>
+              <a:buNone/>
+            </a:pPr>
+            <a:r>
+              <a:rPr lang="pt-BR"/>
+              <a:t>Maxley Soares da Costa 		- 11911BCC038</a:t>
+            </a:r>
+            <a:endParaRPr/>
+          </a:p>
+          <a:p>
+            <a:pPr indent="0" lvl="0" marL="0" rtl="0" algn="l">
+              <a:lnSpc>
+                <a:spcPct val="100000"/>
+              </a:lnSpc>
+              <a:spcBef>
+                <a:spcPts val="0"/>
+              </a:spcBef>
+              <a:spcAft>
+                <a:spcPts val="0"/>
+              </a:spcAft>
+              <a:buSzPts val="1882"/>
+              <a:buNone/>
+            </a:pPr>
+            <a:r>
+              <a:rPr lang="pt-BR"/>
+              <a:t>João Vitor Afonso Pereira 	- 11911BCC037</a:t>
+            </a:r>
+            <a:endParaRPr/>
+          </a:p>
+        </p:txBody>
+      </p:sp>
+    </p:spTree>
+  </p:cSld>
+  <p:clrMapOvr>
+    <a:masterClrMapping/>
+  </p:clrMapOvr>
+</p:sld>
+</file>
+
+<file path=ppt/slides/slide8.xml><?xml version="1.0" encoding="utf-8"?>
+<p:sld xmlns:a="http://schemas.openxmlformats.org/drawingml/2006/main" xmlns:r="http://schemas.openxmlformats.org/officeDocument/2006/relationships" xmlns:mc="http://schemas.openxmlformats.org/markup-compatibility/2006" xmlns:mv="urn:schemas-microsoft-com:mac:vml" xmlns:p="http://schemas.openxmlformats.org/presentationml/2006/main" xmlns:c="http://schemas.openxmlformats.org/drawingml/2006/chart" xmlns:dgm="http://schemas.openxmlformats.org/drawingml/2006/diagram" xmlns:o="urn:schemas-microsoft-com:office:office" xmlns:v="urn:schemas-microsoft-com:vml" xmlns:pvml="urn:schemas-microsoft-com:office:powerpoint" xmlns:com="http://schemas.openxmlformats.org/drawingml/2006/compatibility" xmlns:p14="http://schemas.microsoft.com/office/powerpoint/2010/main" xmlns:p15="http://schemas.microsoft.com/office/powerpoint/2012/main" xmlns:ahyp="http://schemas.microsoft.com/office/drawing/2018/hyperlinkcolor">
+  <p:cSld>
+    <p:spTree>
+      <p:nvGrpSpPr>
+        <p:cNvPr id="204" name="Shape 204"/>
+        <p:cNvGrpSpPr/>
+        <p:nvPr/>
+      </p:nvGrpSpPr>
+      <p:grpSpPr>
+        <a:xfrm>
+          <a:off x="0" y="0"/>
+          <a:ext cx="0" cy="0"/>
+          <a:chOff x="0" y="0"/>
+          <a:chExt cx="0" cy="0"/>
+        </a:xfrm>
+      </p:grpSpPr>
+      <p:sp>
+        <p:nvSpPr>
+          <p:cNvPr id="205" name="Google Shape;205;p32"/>
+          <p:cNvSpPr txBox="1"/>
+          <p:nvPr>
+            <p:ph type="title"/>
+          </p:nvPr>
+        </p:nvSpPr>
+        <p:spPr>
+          <a:xfrm>
+            <a:off x="0" y="501527"/>
+            <a:ext cx="7688700" cy="535200"/>
+          </a:xfrm>
+          <a:prstGeom prst="rect">
+            <a:avLst/>
+          </a:prstGeom>
+          <a:noFill/>
+          <a:ln>
+            <a:noFill/>
+          </a:ln>
+        </p:spPr>
+        <p:txBody>
+          <a:bodyPr anchorCtr="0" anchor="t" bIns="91425" lIns="91425" spcFirstLastPara="1" rIns="91425" wrap="square" tIns="91425">
+            <a:normAutofit/>
+          </a:bodyPr>
+          <a:lstStyle/>
+          <a:p>
+            <a:pPr indent="0" lvl="0" marL="0" rtl="0" algn="l">
+              <a:lnSpc>
+                <a:spcPct val="100000"/>
+              </a:lnSpc>
+              <a:spcBef>
+                <a:spcPts val="0"/>
+              </a:spcBef>
+              <a:spcAft>
+                <a:spcPts val="0"/>
+              </a:spcAft>
+              <a:buSzPts val="2600"/>
+              <a:buNone/>
+            </a:pPr>
+            <a:r>
+              <a:rPr lang="pt-BR" sz="2300">
+                <a:latin typeface="Raleway"/>
+                <a:ea typeface="Raleway"/>
+                <a:cs typeface="Raleway"/>
+                <a:sym typeface="Raleway"/>
+              </a:rPr>
+              <a:t>Correções </a:t>
+            </a:r>
+            <a:endParaRPr/>
+          </a:p>
+        </p:txBody>
+      </p:sp>
+      <p:sp>
+        <p:nvSpPr>
+          <p:cNvPr id="206" name="Google Shape;206;p32"/>
+          <p:cNvSpPr txBox="1"/>
+          <p:nvPr>
+            <p:ph idx="1" type="body"/>
+          </p:nvPr>
+        </p:nvSpPr>
+        <p:spPr>
+          <a:xfrm>
+            <a:off x="111869" y="1235414"/>
+            <a:ext cx="8920200" cy="3822900"/>
+          </a:xfrm>
+          <a:prstGeom prst="rect">
+            <a:avLst/>
+          </a:prstGeom>
+          <a:noFill/>
+          <a:ln>
+            <a:noFill/>
+          </a:ln>
+        </p:spPr>
+        <p:txBody>
+          <a:bodyPr anchorCtr="0" anchor="t" bIns="91425" lIns="91425" spcFirstLastPara="1" rIns="91425" wrap="square" tIns="91425">
+            <a:noAutofit/>
+          </a:bodyPr>
+          <a:lstStyle/>
+          <a:p>
+            <a:pPr indent="-311150" lvl="0" marL="457200" rtl="0" algn="l">
+              <a:lnSpc>
+                <a:spcPct val="115000"/>
+              </a:lnSpc>
+              <a:spcBef>
+                <a:spcPts val="0"/>
+              </a:spcBef>
+              <a:spcAft>
+                <a:spcPts val="0"/>
+              </a:spcAft>
+              <a:buSzPts val="1300"/>
+              <a:buChar char="●"/>
+            </a:pPr>
+            <a:r>
+              <a:rPr lang="pt-BR" sz="1600">
+                <a:solidFill>
+                  <a:schemeClr val="dk2"/>
+                </a:solidFill>
+              </a:rPr>
+              <a:t>Fazer uso de caso para o RF: “Emitir nota fiscal”;</a:t>
+            </a:r>
+            <a:endParaRPr/>
+          </a:p>
+          <a:p>
+            <a:pPr indent="-311150" lvl="0" marL="457200" rtl="0" algn="l">
+              <a:lnSpc>
+                <a:spcPct val="115000"/>
+              </a:lnSpc>
+              <a:spcBef>
+                <a:spcPts val="0"/>
+              </a:spcBef>
+              <a:spcAft>
+                <a:spcPts val="0"/>
+              </a:spcAft>
+              <a:buSzPts val="1300"/>
+              <a:buChar char="●"/>
+            </a:pPr>
+            <a:r>
+              <a:rPr lang="pt-BR" sz="1600">
+                <a:solidFill>
+                  <a:schemeClr val="dk2"/>
+                </a:solidFill>
+              </a:rPr>
+              <a:t>Rastreabilidade: mapear os requisitos (RF(X)/RNF(X)) no Use case (UC(X))</a:t>
+            </a:r>
+            <a:endParaRPr/>
+          </a:p>
+        </p:txBody>
+      </p:sp>
+      <p:pic>
+        <p:nvPicPr>
+          <p:cNvPr id="207" name="Google Shape;207;p32"/>
+          <p:cNvPicPr preferRelativeResize="0"/>
+          <p:nvPr/>
+        </p:nvPicPr>
+        <p:blipFill rotWithShape="1">
+          <a:blip r:embed="rId3">
+            <a:alphaModFix/>
+          </a:blip>
+          <a:srcRect b="0" l="0" r="0" t="0"/>
+          <a:stretch/>
+        </p:blipFill>
+        <p:spPr>
+          <a:xfrm>
+            <a:off x="2575025" y="571500"/>
+            <a:ext cx="5829300" cy="4572000"/>
+          </a:xfrm>
+          <a:prstGeom prst="rect">
+            <a:avLst/>
+          </a:prstGeom>
+          <a:noFill/>
+          <a:ln>
+            <a:noFill/>
+          </a:ln>
+        </p:spPr>
+      </p:pic>
+    </p:spTree>
+  </p:cSld>
+  <p:clrMapOvr>
+    <a:masterClrMapping/>
+  </p:clrMapOvr>
+  <p:timing>
+    <p:tnLst>
+      <p:par>
+        <p:cTn dur="indefinite" nodeType="tmRoot" restart="never">
+          <p:childTnLst>
+            <p:seq concurrent="1" nextAc="seek">
+              <p:cTn dur="indefinite" id="2" nodeType="mainSeq">
+                <p:childTnLst>
+                  <p:par>
+                    <p:cTn fill="hold">
+                      <p:stCondLst>
+                        <p:cond delay="indefinite"/>
+                      </p:stCondLst>
+                      <p:childTnLst>
+                        <p:par>
+                          <p:cTn fill="hold">
+                            <p:stCondLst>
+                              <p:cond delay="0"/>
+                            </p:stCondLst>
+                            <p:childTnLst>
+                              <p:par>
+                                <p:cTn fill="hold" nodeType="clickEffect" presetClass="entr" presetID="1" presetSubtype="0">
+                                  <p:stCondLst>
+                                    <p:cond delay="0"/>
+                                  </p:stCondLst>
+                                  <p:childTnLst>
+                                    <p:set>
+                                      <p:cBhvr>
+                                        <p:cTn dur="1" fill="hold">
+                                          <p:stCondLst>
+                                            <p:cond delay="0"/>
+                                          </p:stCondLst>
+                                        </p:cTn>
+                                        <p:tgtEl>
+                                          <p:spTgt spid="207"/>
+                                        </p:tgtEl>
+                                        <p:attrNameLst>
+                                          <p:attrName>style.visibility</p:attrName>
+                                        </p:attrNameLst>
+                                      </p:cBhvr>
+                                      <p:to>
+                                        <p:strVal val="visible"/>
+                                      </p:to>
+                                    </p:set>
+                                  </p:childTnLst>
+                                </p:cTn>
+                              </p:par>
+                            </p:childTnLst>
+                          </p:cTn>
+                        </p:par>
+                      </p:childTnLst>
+                    </p:cTn>
+                  </p:par>
+                </p:childTnLst>
+              </p:cTn>
+              <p:prevCondLst>
+                <p:cond evt="onPrev">
+                  <p:tgtEl>
+                    <p:sldTgt/>
+                  </p:tgtEl>
+                </p:cond>
+              </p:prevCondLst>
+              <p:nextCondLst>
+                <p:cond evt="onNext">
+                  <p:tgtEl>
+                    <p:sldTgt/>
+                  </p:tgtEl>
+                </p:cond>
+              </p:nextCondLst>
+            </p:seq>
+          </p:childTnLst>
+        </p:cTn>
+      </p:par>
+    </p:tnLst>
+  </p:timing>
+</p:sld>
+</file>
+
+<file path=ppt/slides/slide9.xml><?xml version="1.0" encoding="utf-8"?>
+<p:sld xmlns:a="http://schemas.openxmlformats.org/drawingml/2006/main" xmlns:r="http://schemas.openxmlformats.org/officeDocument/2006/relationships" xmlns:mc="http://schemas.openxmlformats.org/markup-compatibility/2006" xmlns:mv="urn:schemas-microsoft-com:mac:vml" xmlns:p="http://schemas.openxmlformats.org/presentationml/2006/main" xmlns:c="http://schemas.openxmlformats.org/drawingml/2006/chart" xmlns:dgm="http://schemas.openxmlformats.org/drawingml/2006/diagram" xmlns:o="urn:schemas-microsoft-com:office:office" xmlns:v="urn:schemas-microsoft-com:vml" xmlns:pvml="urn:schemas-microsoft-com:office:powerpoint" xmlns:com="http://schemas.openxmlformats.org/drawingml/2006/compatibility" xmlns:p14="http://schemas.microsoft.com/office/powerpoint/2010/main" xmlns:p15="http://schemas.microsoft.com/office/powerpoint/2012/main" xmlns:ahyp="http://schemas.microsoft.com/office/drawing/2018/hyperlinkcolor">
+  <p:cSld>
+    <p:spTree>
+      <p:nvGrpSpPr>
+        <p:cNvPr id="211" name="Shape 211"/>
+        <p:cNvGrpSpPr/>
+        <p:nvPr/>
+      </p:nvGrpSpPr>
+      <p:grpSpPr>
+        <a:xfrm>
+          <a:off x="0" y="0"/>
+          <a:ext cx="0" cy="0"/>
+          <a:chOff x="0" y="0"/>
+          <a:chExt cx="0" cy="0"/>
+        </a:xfrm>
+      </p:grpSpPr>
+      <p:sp>
+        <p:nvSpPr>
+          <p:cNvPr id="212" name="Google Shape;212;p33"/>
+          <p:cNvSpPr txBox="1"/>
+          <p:nvPr>
+            <p:ph type="title"/>
+          </p:nvPr>
+        </p:nvSpPr>
+        <p:spPr>
+          <a:xfrm>
+            <a:off x="0" y="501527"/>
+            <a:ext cx="7688700" cy="535200"/>
+          </a:xfrm>
+          <a:prstGeom prst="rect">
+            <a:avLst/>
+          </a:prstGeom>
+          <a:noFill/>
+          <a:ln>
+            <a:noFill/>
+          </a:ln>
+        </p:spPr>
+        <p:txBody>
+          <a:bodyPr anchorCtr="0" anchor="t" bIns="91425" lIns="91425" spcFirstLastPara="1" rIns="91425" wrap="square" tIns="91425">
+            <a:normAutofit/>
+          </a:bodyPr>
+          <a:lstStyle/>
+          <a:p>
+            <a:pPr indent="0" lvl="0" marL="0" rtl="0" algn="l">
+              <a:lnSpc>
+                <a:spcPct val="100000"/>
+              </a:lnSpc>
+              <a:spcBef>
+                <a:spcPts val="0"/>
+              </a:spcBef>
+              <a:spcAft>
+                <a:spcPts val="0"/>
+              </a:spcAft>
+              <a:buSzPts val="2600"/>
+              <a:buNone/>
+            </a:pPr>
+            <a:r>
+              <a:rPr lang="pt-BR" sz="2300">
+                <a:latin typeface="Raleway"/>
+                <a:ea typeface="Raleway"/>
+                <a:cs typeface="Raleway"/>
+                <a:sym typeface="Raleway"/>
+              </a:rPr>
+              <a:t>Arquitetura &gt; Cliente</a:t>
+            </a:r>
+            <a:endParaRPr/>
+          </a:p>
+        </p:txBody>
+      </p:sp>
+      <p:pic>
+        <p:nvPicPr>
+          <p:cNvPr id="213" name="Google Shape;213;p33"/>
+          <p:cNvPicPr preferRelativeResize="0"/>
+          <p:nvPr/>
+        </p:nvPicPr>
+        <p:blipFill rotWithShape="1">
+          <a:blip r:embed="rId3">
+            <a:alphaModFix/>
+          </a:blip>
+          <a:srcRect b="0" l="0" r="0" t="0"/>
+          <a:stretch/>
+        </p:blipFill>
+        <p:spPr>
+          <a:xfrm>
+            <a:off x="728662" y="1324086"/>
+            <a:ext cx="7686675" cy="3686175"/>
+          </a:xfrm>
+          <a:prstGeom prst="rect">
+            <a:avLst/>
+          </a:prstGeom>
+          <a:noFill/>
+          <a:ln>
+            <a:noFill/>
+          </a:ln>
+        </p:spPr>
+      </p:pic>
+    </p:spTree>
+  </p:cSld>
+  <p:clrMapOvr>
+    <a:masterClrMapping/>
+  </p:clrMapOvr>
+</p:sld>
+</file>
+
 <file path=ppt/theme/theme1.xml><?xml version="1.0" encoding="utf-8"?>
-<a:theme xmlns:a="http://schemas.openxmlformats.org/drawingml/2006/main" xmlns:r="http://schemas.openxmlformats.org/officeDocument/2006/relationships" name="Streamline">
+<a:theme xmlns:a="http://schemas.openxmlformats.org/drawingml/2006/main" xmlns:r="http://schemas.openxmlformats.org/officeDocument/2006/relationships">
   <a:themeElements>
-    <a:clrScheme name="Streamline">
+    <a:clrScheme name="Default">
       <a:dk1>
-        <a:srgbClr val="1A9988"/>
+        <a:srgbClr val="000000"/>
       </a:dk1>
       <a:lt1>
         <a:srgbClr val="FFFFFF"/>
       </a:lt1>
       <a:dk2>
-        <a:srgbClr val="1A1A1A"/>
+        <a:srgbClr val="158158"/>
       </a:dk2>
       <a:lt2>
-        <a:srgbClr val="E9EDEE"/>
+        <a:srgbClr val="F3F3F3"/>
       </a:lt2>
       <a:accent1>
-        <a:srgbClr val="595959"/>
+        <a:srgbClr val="058DC7"/>
       </a:accent1>
       <a:accent2>
-        <a:srgbClr val="6AA4C8"/>
+        <a:srgbClr val="50B432"/>
       </a:accent2>
       <a:accent3>
-        <a:srgbClr val="EB5600"/>
+        <a:srgbClr val="ED561B"/>
       </a:accent3>
       <a:accent4>
-        <a:srgbClr val="A2FFE8"/>
+        <a:srgbClr val="EDEF00"/>
       </a:accent4>
       <a:accent5>
-        <a:srgbClr val="1C3678"/>
+        <a:srgbClr val="24CBE5"/>
       </a:accent5>
       <a:accent6>
-        <a:srgbClr val="FFB8A2"/>
+        <a:srgbClr val="64E572"/>
       </a:accent6>
       <a:hlink>
-        <a:srgbClr val="1C3678"/>
+        <a:srgbClr val="2200CC"/>
       </a:hlink>
       <a:folHlink>
-        <a:srgbClr val="1C3678"/>
+        <a:srgbClr val="551A8B"/>
       </a:folHlink>
     </a:clrScheme>
     <a:fontScheme name="Office">
@@ -19532,44 +20636,44 @@
 </file>
 
 <file path=ppt/theme/theme2.xml><?xml version="1.0" encoding="utf-8"?>
-<a:theme xmlns:a="http://schemas.openxmlformats.org/drawingml/2006/main" xmlns:r="http://schemas.openxmlformats.org/officeDocument/2006/relationships">
+<a:theme xmlns:a="http://schemas.openxmlformats.org/drawingml/2006/main" xmlns:r="http://schemas.openxmlformats.org/officeDocument/2006/relationships" name="Streamline">
   <a:themeElements>
-    <a:clrScheme name="Default">
+    <a:clrScheme name="Streamline">
       <a:dk1>
-        <a:srgbClr val="000000"/>
+        <a:srgbClr val="1A9988"/>
       </a:dk1>
       <a:lt1>
         <a:srgbClr val="FFFFFF"/>
       </a:lt1>
       <a:dk2>
-        <a:srgbClr val="158158"/>
+        <a:srgbClr val="1A1A1A"/>
       </a:dk2>
       <a:lt2>
-        <a:srgbClr val="F3F3F3"/>
+        <a:srgbClr val="E9EDEE"/>
       </a:lt2>
       <a:accent1>
-        <a:srgbClr val="058DC7"/>
+        <a:srgbClr val="595959"/>
       </a:accent1>
       <a:accent2>
-        <a:srgbClr val="50B432"/>
+        <a:srgbClr val="6AA4C8"/>
       </a:accent2>
       <a:accent3>
-        <a:srgbClr val="ED561B"/>
+        <a:srgbClr val="EB5600"/>
       </a:accent3>
       <a:accent4>
-        <a:srgbClr val="EDEF00"/>
+        <a:srgbClr val="A2FFE8"/>
       </a:accent4>
       <a:accent5>
-        <a:srgbClr val="24CBE5"/>
+        <a:srgbClr val="1C3678"/>
       </a:accent5>
       <a:accent6>
-        <a:srgbClr val="64E572"/>
+        <a:srgbClr val="FFB8A2"/>
       </a:accent6>
       <a:hlink>
-        <a:srgbClr val="2200CC"/>
+        <a:srgbClr val="1C3678"/>
       </a:hlink>
       <a:folHlink>
-        <a:srgbClr val="551A8B"/>
+        <a:srgbClr val="1C3678"/>
       </a:folHlink>
     </a:clrScheme>
     <a:fontScheme name="Office">

</xml_diff>